<commit_message>
Fix links to exercise md in htc presentation
</commit_message>
<xml_diff>
--- a/2017_July/Day_Two/[09]_htc.pptx
+++ b/2017_July/Day_Two/[09]_htc.pptx
@@ -223,7 +223,7 @@
           <a:p>
             <a:fld id="{71347268-C720-2A4B-8212-B3C5C270072A}" type="datetimeFigureOut">
               <a:rPr lang="en-US" smtClean="0"/>
-              <a:t>7/18/17</a:t>
+              <a:t>7/20/17</a:t>
             </a:fld>
             <a:endParaRPr lang="en-US"/>
           </a:p>
@@ -854,19 +854,7 @@
                 <a:ea typeface="+mn-ea"/>
                 <a:cs typeface="+mn-cs"/>
               </a:rPr>
-              <a:t>As with most computing problems there are a variety of tools available. </a:t>
-            </a:r>
-            <a:r>
-              <a:rPr lang="en-US" sz="1200" b="0" i="0" u="none" strike="noStrike" kern="1200" dirty="0" smtClean="0">
-                <a:solidFill>
-                  <a:schemeClr val="tx1"/>
-                </a:solidFill>
-                <a:effectLst/>
-                <a:latin typeface="+mn-lt"/>
-                <a:ea typeface="+mn-ea"/>
-                <a:cs typeface="+mn-cs"/>
-              </a:rPr>
-              <a:t>In an expanded version of this talk, we go over several</a:t>
+              <a:t>As with most computing problems there are a variety of tools available. In an expanded version of this talk, we go over several</a:t>
             </a:r>
             <a:r>
               <a:rPr lang="en-US" sz="1200" b="0" i="0" u="none" strike="noStrike" kern="1200" baseline="0" dirty="0" smtClean="0">
@@ -1967,7 +1955,7 @@
           <a:p>
             <a:fld id="{92D22C47-FF12-AA46-B2C3-6B8DB400D9A6}" type="datetimeFigureOut">
               <a:rPr lang="en-US" smtClean="0"/>
-              <a:t>7/18/17</a:t>
+              <a:t>7/20/17</a:t>
             </a:fld>
             <a:endParaRPr lang="en-US"/>
           </a:p>
@@ -2153,7 +2141,7 @@
           <a:p>
             <a:fld id="{92D22C47-FF12-AA46-B2C3-6B8DB400D9A6}" type="datetimeFigureOut">
               <a:rPr lang="en-US" smtClean="0"/>
-              <a:t>7/18/17</a:t>
+              <a:t>7/20/17</a:t>
             </a:fld>
             <a:endParaRPr lang="en-US"/>
           </a:p>
@@ -2349,7 +2337,7 @@
           <a:p>
             <a:fld id="{92D22C47-FF12-AA46-B2C3-6B8DB400D9A6}" type="datetimeFigureOut">
               <a:rPr lang="en-US" smtClean="0"/>
-              <a:t>7/18/17</a:t>
+              <a:t>7/20/17</a:t>
             </a:fld>
             <a:endParaRPr lang="en-US"/>
           </a:p>
@@ -2632,7 +2620,7 @@
           <a:p>
             <a:fld id="{92D22C47-FF12-AA46-B2C3-6B8DB400D9A6}" type="datetimeFigureOut">
               <a:rPr lang="en-US" smtClean="0"/>
-              <a:t>7/18/17</a:t>
+              <a:t>7/20/17</a:t>
             </a:fld>
             <a:endParaRPr lang="en-US"/>
           </a:p>
@@ -2883,7 +2871,7 @@
           <a:p>
             <a:fld id="{92D22C47-FF12-AA46-B2C3-6B8DB400D9A6}" type="datetimeFigureOut">
               <a:rPr lang="en-US" smtClean="0"/>
-              <a:t>7/18/17</a:t>
+              <a:t>7/20/17</a:t>
             </a:fld>
             <a:endParaRPr lang="en-US"/>
           </a:p>
@@ -3069,7 +3057,7 @@
           <a:p>
             <a:fld id="{92D22C47-FF12-AA46-B2C3-6B8DB400D9A6}" type="datetimeFigureOut">
               <a:rPr lang="en-US" smtClean="0"/>
-              <a:t>7/18/17</a:t>
+              <a:t>7/20/17</a:t>
             </a:fld>
             <a:endParaRPr lang="en-US"/>
           </a:p>
@@ -3331,7 +3319,7 @@
           <a:p>
             <a:fld id="{92D22C47-FF12-AA46-B2C3-6B8DB400D9A6}" type="datetimeFigureOut">
               <a:rPr lang="en-US" smtClean="0"/>
-              <a:t>7/18/17</a:t>
+              <a:t>7/20/17</a:t>
             </a:fld>
             <a:endParaRPr lang="en-US"/>
           </a:p>
@@ -3635,7 +3623,7 @@
           <a:p>
             <a:fld id="{92D22C47-FF12-AA46-B2C3-6B8DB400D9A6}" type="datetimeFigureOut">
               <a:rPr lang="en-US" smtClean="0"/>
-              <a:t>7/18/17</a:t>
+              <a:t>7/20/17</a:t>
             </a:fld>
             <a:endParaRPr lang="en-US"/>
           </a:p>
@@ -4085,7 +4073,7 @@
           <a:p>
             <a:fld id="{92D22C47-FF12-AA46-B2C3-6B8DB400D9A6}" type="datetimeFigureOut">
               <a:rPr lang="en-US" smtClean="0"/>
-              <a:t>7/18/17</a:t>
+              <a:t>7/20/17</a:t>
             </a:fld>
             <a:endParaRPr lang="en-US"/>
           </a:p>
@@ -4219,7 +4207,7 @@
           <a:p>
             <a:fld id="{92D22C47-FF12-AA46-B2C3-6B8DB400D9A6}" type="datetimeFigureOut">
               <a:rPr lang="en-US" smtClean="0"/>
-              <a:t>7/18/17</a:t>
+              <a:t>7/20/17</a:t>
             </a:fld>
             <a:endParaRPr lang="en-US"/>
           </a:p>
@@ -4330,7 +4318,7 @@
           <a:p>
             <a:fld id="{92D22C47-FF12-AA46-B2C3-6B8DB400D9A6}" type="datetimeFigureOut">
               <a:rPr lang="en-US" smtClean="0"/>
-              <a:t>7/18/17</a:t>
+              <a:t>7/20/17</a:t>
             </a:fld>
             <a:endParaRPr lang="en-US"/>
           </a:p>
@@ -4516,7 +4504,7 @@
           <a:p>
             <a:fld id="{92D22C47-FF12-AA46-B2C3-6B8DB400D9A6}" type="datetimeFigureOut">
               <a:rPr lang="en-US" smtClean="0"/>
-              <a:t>7/18/17</a:t>
+              <a:t>7/20/17</a:t>
             </a:fld>
             <a:endParaRPr lang="en-US"/>
           </a:p>
@@ -4726,7 +4714,7 @@
           <a:p>
             <a:fld id="{92D22C47-FF12-AA46-B2C3-6B8DB400D9A6}" type="datetimeFigureOut">
               <a:rPr lang="en-US" smtClean="0"/>
-              <a:t>7/18/17</a:t>
+              <a:t>7/20/17</a:t>
             </a:fld>
             <a:endParaRPr lang="en-US"/>
           </a:p>
@@ -5065,7 +5053,7 @@
           <a:p>
             <a:fld id="{92D22C47-FF12-AA46-B2C3-6B8DB400D9A6}" type="datetimeFigureOut">
               <a:rPr lang="en-US" smtClean="0"/>
-              <a:t>7/18/17</a:t>
+              <a:t>7/20/17</a:t>
             </a:fld>
             <a:endParaRPr lang="en-US"/>
           </a:p>
@@ -5251,7 +5239,7 @@
           <a:p>
             <a:fld id="{92D22C47-FF12-AA46-B2C3-6B8DB400D9A6}" type="datetimeFigureOut">
               <a:rPr lang="en-US" smtClean="0"/>
-              <a:t>7/18/17</a:t>
+              <a:t>7/20/17</a:t>
             </a:fld>
             <a:endParaRPr lang="en-US"/>
           </a:p>
@@ -5447,7 +5435,7 @@
           <a:p>
             <a:fld id="{92D22C47-FF12-AA46-B2C3-6B8DB400D9A6}" type="datetimeFigureOut">
               <a:rPr lang="en-US" smtClean="0"/>
-              <a:t>7/18/17</a:t>
+              <a:t>7/20/17</a:t>
             </a:fld>
             <a:endParaRPr lang="en-US"/>
           </a:p>
@@ -5730,7 +5718,7 @@
           <a:p>
             <a:fld id="{92D22C47-FF12-AA46-B2C3-6B8DB400D9A6}" type="datetimeFigureOut">
               <a:rPr lang="en-US" smtClean="0"/>
-              <a:t>7/18/17</a:t>
+              <a:t>7/20/17</a:t>
             </a:fld>
             <a:endParaRPr lang="en-US"/>
           </a:p>
@@ -5986,7 +5974,7 @@
           <a:p>
             <a:fld id="{92D22C47-FF12-AA46-B2C3-6B8DB400D9A6}" type="datetimeFigureOut">
               <a:rPr lang="en-US" smtClean="0"/>
-              <a:t>7/18/17</a:t>
+              <a:t>7/20/17</a:t>
             </a:fld>
             <a:endParaRPr lang="en-US"/>
           </a:p>
@@ -6177,7 +6165,7 @@
           <a:p>
             <a:fld id="{92D22C47-FF12-AA46-B2C3-6B8DB400D9A6}" type="datetimeFigureOut">
               <a:rPr lang="en-US" smtClean="0"/>
-              <a:t>7/18/17</a:t>
+              <a:t>7/20/17</a:t>
             </a:fld>
             <a:endParaRPr lang="en-US"/>
           </a:p>
@@ -6439,7 +6427,7 @@
           <a:p>
             <a:fld id="{92D22C47-FF12-AA46-B2C3-6B8DB400D9A6}" type="datetimeFigureOut">
               <a:rPr lang="en-US" smtClean="0"/>
-              <a:t>7/18/17</a:t>
+              <a:t>7/20/17</a:t>
             </a:fld>
             <a:endParaRPr lang="en-US"/>
           </a:p>
@@ -6743,7 +6731,7 @@
           <a:p>
             <a:fld id="{92D22C47-FF12-AA46-B2C3-6B8DB400D9A6}" type="datetimeFigureOut">
               <a:rPr lang="en-US" smtClean="0"/>
-              <a:t>7/18/17</a:t>
+              <a:t>7/20/17</a:t>
             </a:fld>
             <a:endParaRPr lang="en-US"/>
           </a:p>
@@ -7193,7 +7181,7 @@
           <a:p>
             <a:fld id="{92D22C47-FF12-AA46-B2C3-6B8DB400D9A6}" type="datetimeFigureOut">
               <a:rPr lang="en-US" smtClean="0"/>
-              <a:t>7/18/17</a:t>
+              <a:t>7/20/17</a:t>
             </a:fld>
             <a:endParaRPr lang="en-US"/>
           </a:p>
@@ -7455,7 +7443,7 @@
           <a:p>
             <a:fld id="{92D22C47-FF12-AA46-B2C3-6B8DB400D9A6}" type="datetimeFigureOut">
               <a:rPr lang="en-US" smtClean="0"/>
-              <a:t>7/18/17</a:t>
+              <a:t>7/20/17</a:t>
             </a:fld>
             <a:endParaRPr lang="en-US"/>
           </a:p>
@@ -7589,7 +7577,7 @@
           <a:p>
             <a:fld id="{92D22C47-FF12-AA46-B2C3-6B8DB400D9A6}" type="datetimeFigureOut">
               <a:rPr lang="en-US" smtClean="0"/>
-              <a:t>7/18/17</a:t>
+              <a:t>7/20/17</a:t>
             </a:fld>
             <a:endParaRPr lang="en-US"/>
           </a:p>
@@ -7700,7 +7688,7 @@
           <a:p>
             <a:fld id="{92D22C47-FF12-AA46-B2C3-6B8DB400D9A6}" type="datetimeFigureOut">
               <a:rPr lang="en-US" smtClean="0"/>
-              <a:t>7/18/17</a:t>
+              <a:t>7/20/17</a:t>
             </a:fld>
             <a:endParaRPr lang="en-US"/>
           </a:p>
@@ -7910,7 +7898,7 @@
           <a:p>
             <a:fld id="{92D22C47-FF12-AA46-B2C3-6B8DB400D9A6}" type="datetimeFigureOut">
               <a:rPr lang="en-US" smtClean="0"/>
-              <a:t>7/18/17</a:t>
+              <a:t>7/20/17</a:t>
             </a:fld>
             <a:endParaRPr lang="en-US"/>
           </a:p>
@@ -8249,7 +8237,7 @@
           <a:p>
             <a:fld id="{92D22C47-FF12-AA46-B2C3-6B8DB400D9A6}" type="datetimeFigureOut">
               <a:rPr lang="en-US" smtClean="0"/>
-              <a:t>7/18/17</a:t>
+              <a:t>7/20/17</a:t>
             </a:fld>
             <a:endParaRPr lang="en-US"/>
           </a:p>
@@ -8435,7 +8423,7 @@
           <a:p>
             <a:fld id="{92D22C47-FF12-AA46-B2C3-6B8DB400D9A6}" type="datetimeFigureOut">
               <a:rPr lang="en-US" smtClean="0"/>
-              <a:t>7/18/17</a:t>
+              <a:t>7/20/17</a:t>
             </a:fld>
             <a:endParaRPr lang="en-US"/>
           </a:p>
@@ -8631,7 +8619,7 @@
           <a:p>
             <a:fld id="{92D22C47-FF12-AA46-B2C3-6B8DB400D9A6}" type="datetimeFigureOut">
               <a:rPr lang="en-US" smtClean="0"/>
-              <a:t>7/18/17</a:t>
+              <a:t>7/20/17</a:t>
             </a:fld>
             <a:endParaRPr lang="en-US"/>
           </a:p>
@@ -9105,7 +9093,7 @@
           <a:p>
             <a:fld id="{92D22C47-FF12-AA46-B2C3-6B8DB400D9A6}" type="datetimeFigureOut">
               <a:rPr lang="en-US" smtClean="0"/>
-              <a:t>7/18/17</a:t>
+              <a:t>7/20/17</a:t>
             </a:fld>
             <a:endParaRPr lang="en-US"/>
           </a:p>
@@ -9296,7 +9284,7 @@
           <a:p>
             <a:fld id="{92D22C47-FF12-AA46-B2C3-6B8DB400D9A6}" type="datetimeFigureOut">
               <a:rPr lang="en-US" smtClean="0"/>
-              <a:t>7/18/17</a:t>
+              <a:t>7/20/17</a:t>
             </a:fld>
             <a:endParaRPr lang="en-US"/>
           </a:p>
@@ -9558,7 +9546,7 @@
           <a:p>
             <a:fld id="{92D22C47-FF12-AA46-B2C3-6B8DB400D9A6}" type="datetimeFigureOut">
               <a:rPr lang="en-US" smtClean="0"/>
-              <a:t>7/18/17</a:t>
+              <a:t>7/20/17</a:t>
             </a:fld>
             <a:endParaRPr lang="en-US"/>
           </a:p>
@@ -9862,7 +9850,7 @@
           <a:p>
             <a:fld id="{92D22C47-FF12-AA46-B2C3-6B8DB400D9A6}" type="datetimeFigureOut">
               <a:rPr lang="en-US" smtClean="0"/>
-              <a:t>7/18/17</a:t>
+              <a:t>7/20/17</a:t>
             </a:fld>
             <a:endParaRPr lang="en-US"/>
           </a:p>
@@ -10166,7 +10154,7 @@
           <a:p>
             <a:fld id="{92D22C47-FF12-AA46-B2C3-6B8DB400D9A6}" type="datetimeFigureOut">
               <a:rPr lang="en-US" smtClean="0"/>
-              <a:t>7/18/17</a:t>
+              <a:t>7/20/17</a:t>
             </a:fld>
             <a:endParaRPr lang="en-US"/>
           </a:p>
@@ -10616,7 +10604,7 @@
           <a:p>
             <a:fld id="{92D22C47-FF12-AA46-B2C3-6B8DB400D9A6}" type="datetimeFigureOut">
               <a:rPr lang="en-US" smtClean="0"/>
-              <a:t>7/18/17</a:t>
+              <a:t>7/20/17</a:t>
             </a:fld>
             <a:endParaRPr lang="en-US"/>
           </a:p>
@@ -10750,7 +10738,7 @@
           <a:p>
             <a:fld id="{92D22C47-FF12-AA46-B2C3-6B8DB400D9A6}" type="datetimeFigureOut">
               <a:rPr lang="en-US" smtClean="0"/>
-              <a:t>7/18/17</a:t>
+              <a:t>7/20/17</a:t>
             </a:fld>
             <a:endParaRPr lang="en-US"/>
           </a:p>
@@ -10861,7 +10849,7 @@
           <a:p>
             <a:fld id="{92D22C47-FF12-AA46-B2C3-6B8DB400D9A6}" type="datetimeFigureOut">
               <a:rPr lang="en-US" smtClean="0"/>
-              <a:t>7/18/17</a:t>
+              <a:t>7/20/17</a:t>
             </a:fld>
             <a:endParaRPr lang="en-US"/>
           </a:p>
@@ -11071,7 +11059,7 @@
           <a:p>
             <a:fld id="{92D22C47-FF12-AA46-B2C3-6B8DB400D9A6}" type="datetimeFigureOut">
               <a:rPr lang="en-US" smtClean="0"/>
-              <a:t>7/18/17</a:t>
+              <a:t>7/20/17</a:t>
             </a:fld>
             <a:endParaRPr lang="en-US"/>
           </a:p>
@@ -11410,7 +11398,7 @@
           <a:p>
             <a:fld id="{92D22C47-FF12-AA46-B2C3-6B8DB400D9A6}" type="datetimeFigureOut">
               <a:rPr lang="en-US" smtClean="0"/>
-              <a:t>7/18/17</a:t>
+              <a:t>7/20/17</a:t>
             </a:fld>
             <a:endParaRPr lang="en-US"/>
           </a:p>
@@ -11596,7 +11584,7 @@
           <a:p>
             <a:fld id="{92D22C47-FF12-AA46-B2C3-6B8DB400D9A6}" type="datetimeFigureOut">
               <a:rPr lang="en-US" smtClean="0"/>
-              <a:t>7/18/17</a:t>
+              <a:t>7/20/17</a:t>
             </a:fld>
             <a:endParaRPr lang="en-US"/>
           </a:p>
@@ -11792,7 +11780,7 @@
           <a:p>
             <a:fld id="{92D22C47-FF12-AA46-B2C3-6B8DB400D9A6}" type="datetimeFigureOut">
               <a:rPr lang="en-US" smtClean="0"/>
-              <a:t>7/18/17</a:t>
+              <a:t>7/20/17</a:t>
             </a:fld>
             <a:endParaRPr lang="en-US"/>
           </a:p>
@@ -12440,7 +12428,7 @@
           <a:p>
             <a:fld id="{92D22C47-FF12-AA46-B2C3-6B8DB400D9A6}" type="datetimeFigureOut">
               <a:rPr lang="en-US" smtClean="0"/>
-              <a:t>7/18/17</a:t>
+              <a:t>7/20/17</a:t>
             </a:fld>
             <a:endParaRPr lang="en-US"/>
           </a:p>
@@ -12574,7 +12562,7 @@
           <a:p>
             <a:fld id="{92D22C47-FF12-AA46-B2C3-6B8DB400D9A6}" type="datetimeFigureOut">
               <a:rPr lang="en-US" smtClean="0"/>
-              <a:t>7/18/17</a:t>
+              <a:t>7/20/17</a:t>
             </a:fld>
             <a:endParaRPr lang="en-US"/>
           </a:p>
@@ -12685,7 +12673,7 @@
           <a:p>
             <a:fld id="{92D22C47-FF12-AA46-B2C3-6B8DB400D9A6}" type="datetimeFigureOut">
               <a:rPr lang="en-US" smtClean="0"/>
-              <a:t>7/18/17</a:t>
+              <a:t>7/20/17</a:t>
             </a:fld>
             <a:endParaRPr lang="en-US"/>
           </a:p>
@@ -12895,7 +12883,7 @@
           <a:p>
             <a:fld id="{92D22C47-FF12-AA46-B2C3-6B8DB400D9A6}" type="datetimeFigureOut">
               <a:rPr lang="en-US" smtClean="0"/>
-              <a:t>7/18/17</a:t>
+              <a:t>7/20/17</a:t>
             </a:fld>
             <a:endParaRPr lang="en-US"/>
           </a:p>
@@ -13234,7 +13222,7 @@
           <a:p>
             <a:fld id="{92D22C47-FF12-AA46-B2C3-6B8DB400D9A6}" type="datetimeFigureOut">
               <a:rPr lang="en-US" smtClean="0"/>
-              <a:t>7/18/17</a:t>
+              <a:t>7/20/17</a:t>
             </a:fld>
             <a:endParaRPr lang="en-US"/>
           </a:p>
@@ -13589,7 +13577,7 @@
           <a:p>
             <a:fld id="{92D22C47-FF12-AA46-B2C3-6B8DB400D9A6}" type="datetimeFigureOut">
               <a:rPr lang="en-US" smtClean="0"/>
-              <a:t>7/18/17</a:t>
+              <a:t>7/20/17</a:t>
             </a:fld>
             <a:endParaRPr lang="en-US"/>
           </a:p>
@@ -14287,7 +14275,7 @@
           <a:p>
             <a:fld id="{92D22C47-FF12-AA46-B2C3-6B8DB400D9A6}" type="datetimeFigureOut">
               <a:rPr lang="en-US" smtClean="0"/>
-              <a:t>7/18/17</a:t>
+              <a:t>7/20/17</a:t>
             </a:fld>
             <a:endParaRPr lang="en-US"/>
           </a:p>
@@ -14985,7 +14973,7 @@
           <a:p>
             <a:fld id="{92D22C47-FF12-AA46-B2C3-6B8DB400D9A6}" type="datetimeFigureOut">
               <a:rPr lang="en-US" smtClean="0"/>
-              <a:t>7/18/17</a:t>
+              <a:t>7/20/17</a:t>
             </a:fld>
             <a:endParaRPr lang="en-US"/>
           </a:p>
@@ -15683,7 +15671,7 @@
           <a:p>
             <a:fld id="{92D22C47-FF12-AA46-B2C3-6B8DB400D9A6}" type="datetimeFigureOut">
               <a:rPr lang="en-US" smtClean="0"/>
-              <a:t>7/18/17</a:t>
+              <a:t>7/20/17</a:t>
             </a:fld>
             <a:endParaRPr lang="en-US"/>
           </a:p>
@@ -16384,15 +16372,7 @@
           <a:p>
             <a:r>
               <a:rPr lang="en-US" dirty="0" smtClean="0"/>
-              <a:t>Exercise </a:t>
-            </a:r>
-            <a:r>
-              <a:rPr lang="en-US" dirty="0" smtClean="0"/>
-              <a:t>1</a:t>
-            </a:r>
-            <a:r>
-              <a:rPr lang="en-US" dirty="0" smtClean="0"/>
-              <a:t/>
+              <a:t>Exercise 1</a:t>
             </a:r>
             <a:br>
               <a:rPr lang="en-US" dirty="0" smtClean="0"/>
@@ -16473,11 +16453,7 @@
             </a:r>
             <a:r>
               <a:rPr lang="en-US" dirty="0" smtClean="0"/>
-              <a:t>job array. E</a:t>
-            </a:r>
-            <a:r>
-              <a:rPr lang="en-US" dirty="0" smtClean="0"/>
-              <a:t>ach array task should execute a single </a:t>
+              <a:t>job array. Each array task should execute a single </a:t>
             </a:r>
             <a:r>
               <a:rPr lang="en-US" dirty="0" smtClean="0">
@@ -16529,13 +16505,13 @@
               <a:rPr lang="en-US" dirty="0">
                 <a:hlinkClick r:id="rId2"/>
               </a:rPr>
-              <a:t>https://</a:t>
+              <a:t>https://github.com/ResearchComputing/Basics_Supercomputing/blob/master/2017_July/Day_Two/%</a:t>
             </a:r>
             <a:r>
               <a:rPr lang="en-US" dirty="0" smtClean="0">
                 <a:hlinkClick r:id="rId2"/>
               </a:rPr>
-              <a:t>github.com/ResearchComputing/Parallelization_Workshop/blob/master/Day2-HTC/exercises/exercise5.md</a:t>
+              <a:t>5B09%5D_htc/exercises/exercise1.md</a:t>
             </a:r>
             <a:endParaRPr lang="en-US" dirty="0"/>
           </a:p>
@@ -16588,15 +16564,7 @@
           <a:p>
             <a:r>
               <a:rPr lang="en-US" dirty="0" smtClean="0"/>
-              <a:t>Exercise </a:t>
-            </a:r>
-            <a:r>
-              <a:rPr lang="en-US" dirty="0" smtClean="0"/>
-              <a:t>1 </a:t>
-            </a:r>
-            <a:r>
-              <a:rPr lang="en-US" dirty="0" smtClean="0"/>
-              <a:t>(solution)</a:t>
+              <a:t>Exercise 1 (solution)</a:t>
             </a:r>
             <a:br>
               <a:rPr lang="en-US" dirty="0" smtClean="0"/>
@@ -16681,14 +16649,6 @@
               </a:rPr>
               <a:t>htc-exercise1-slurm-arrays</a:t>
             </a:r>
-            <a:r>
-              <a:rPr lang="en-US" dirty="0" smtClean="0">
-                <a:latin typeface="Menlo" charset="0"/>
-                <a:ea typeface="Menlo" charset="0"/>
-                <a:cs typeface="Menlo" charset="0"/>
-              </a:rPr>
-              <a:t/>
-            </a:r>
             <a:br>
               <a:rPr lang="en-US" dirty="0" smtClean="0">
                 <a:latin typeface="Menlo" charset="0"/>
@@ -16796,15 +16756,7 @@
                 <a:ea typeface="Menlo" charset="0"/>
                 <a:cs typeface="Menlo" charset="0"/>
               </a:rPr>
-              <a:t>htc-exercise1-</a:t>
-            </a:r>
-            <a:r>
-              <a:rPr lang="en-US" dirty="0" smtClean="0">
-                <a:latin typeface="Menlo" charset="0"/>
-                <a:ea typeface="Menlo" charset="0"/>
-                <a:cs typeface="Menlo" charset="0"/>
-              </a:rPr>
-              <a:t>%A.%</a:t>
+              <a:t>htc-exercise1-%A.%</a:t>
             </a:r>
             <a:r>
               <a:rPr lang="en-US" dirty="0" err="1" smtClean="0">
@@ -17052,15 +17004,7 @@
           <a:p>
             <a:r>
               <a:rPr lang="en-US" dirty="0" smtClean="0"/>
-              <a:t>Exercise </a:t>
-            </a:r>
-            <a:r>
-              <a:rPr lang="en-US" dirty="0" smtClean="0"/>
-              <a:t>1 </a:t>
-            </a:r>
-            <a:r>
-              <a:rPr lang="en-US" dirty="0" smtClean="0"/>
-              <a:t>(solution)</a:t>
+              <a:t>Exercise 1 (solution)</a:t>
             </a:r>
             <a:br>
               <a:rPr lang="en-US" dirty="0" smtClean="0"/>
@@ -17138,11 +17082,6 @@
               </a:rPr>
               <a:t>\</a:t>
             </a:r>
-            <a:endParaRPr lang="en-US" dirty="0" smtClean="0">
-              <a:latin typeface="Menlo" charset="0"/>
-              <a:ea typeface="Menlo" charset="0"/>
-              <a:cs typeface="Menlo" charset="0"/>
-            </a:endParaRPr>
           </a:p>
           <a:p>
             <a:pPr marL="114300" indent="0">
@@ -17154,15 +17093,7 @@
                 <a:ea typeface="Menlo" charset="0"/>
                 <a:cs typeface="Menlo" charset="0"/>
               </a:rPr>
-              <a:t>&gt; </a:t>
-            </a:r>
-            <a:r>
-              <a:rPr lang="en-US" dirty="0" smtClean="0">
-                <a:latin typeface="Menlo" charset="0"/>
-                <a:ea typeface="Menlo" charset="0"/>
-                <a:cs typeface="Menlo" charset="0"/>
-              </a:rPr>
-              <a:t>solutions/exercise1 .</a:t>
+              <a:t>&gt; solutions/exercise1 .</a:t>
             </a:r>
             <a:r>
               <a:rPr lang="en-US" dirty="0" err="1" smtClean="0">
@@ -18118,15 +18049,7 @@
                 <a:ea typeface="Menlo" charset="0"/>
                 <a:cs typeface="Menlo" charset="0"/>
               </a:rPr>
-              <a:t>$ </a:t>
-            </a:r>
-            <a:r>
-              <a:rPr lang="en-US" dirty="0" smtClean="0">
-                <a:latin typeface="Menlo" charset="0"/>
-                <a:ea typeface="Menlo" charset="0"/>
-                <a:cs typeface="Menlo" charset="0"/>
-              </a:rPr>
-              <a:t>bash </a:t>
+              <a:t>$ bash </a:t>
             </a:r>
             <a:r>
               <a:rPr lang="en-US" dirty="0" err="1" smtClean="0">
@@ -18599,15 +18522,7 @@
           <a:p>
             <a:r>
               <a:rPr lang="en-US" dirty="0" smtClean="0"/>
-              <a:t>Exercise </a:t>
-            </a:r>
-            <a:r>
-              <a:rPr lang="en-US" dirty="0" smtClean="0"/>
-              <a:t>2</a:t>
-            </a:r>
-            <a:r>
-              <a:rPr lang="en-US" dirty="0" smtClean="0"/>
-              <a:t/>
+              <a:t>Exercise 2</a:t>
             </a:r>
             <a:br>
               <a:rPr lang="en-US" dirty="0" smtClean="0"/>
@@ -18709,11 +18624,7 @@
           <a:p>
             <a:r>
               <a:rPr lang="en-US" dirty="0" smtClean="0"/>
-              <a:t>Each </a:t>
-            </a:r>
-            <a:r>
-              <a:rPr lang="en-US" dirty="0" smtClean="0"/>
-              <a:t>task / input file line </a:t>
+              <a:t>Each task / input file line </a:t>
             </a:r>
             <a:r>
               <a:rPr lang="en-US" dirty="0"/>
@@ -18741,11 +18652,7 @@
             </a:r>
             <a:r>
               <a:rPr lang="en-US" dirty="0" smtClean="0"/>
-              <a:t>process</a:t>
-            </a:r>
-            <a:r>
-              <a:rPr lang="en-US" dirty="0" smtClean="0"/>
-              <a:t>.</a:t>
+              <a:t>process.</a:t>
             </a:r>
           </a:p>
           <a:p>
@@ -18761,7 +18668,6 @@
               <a:rPr lang="en-US" dirty="0"/>
               <a:t> output file?</a:t>
             </a:r>
-            <a:endParaRPr lang="en-US" dirty="0"/>
           </a:p>
         </p:txBody>
       </p:sp>
@@ -18791,13 +18697,13 @@
               <a:rPr lang="en-US" dirty="0">
                 <a:hlinkClick r:id="rId2"/>
               </a:rPr>
-              <a:t>https://</a:t>
+              <a:t>https://github.com/ResearchComputing/Basics_Supercomputing/blob/master/2017_July/Day_Two/%</a:t>
             </a:r>
             <a:r>
               <a:rPr lang="en-US" dirty="0" smtClean="0">
                 <a:hlinkClick r:id="rId2"/>
               </a:rPr>
-              <a:t>github.com/ResearchComputing/Parallelization_Workshop/blob/master/Day2-HTC/exercises/exercise6.md</a:t>
+              <a:t>5B09%5D_htc/exercises/exercise2.md</a:t>
             </a:r>
             <a:endParaRPr lang="en-US" dirty="0"/>
           </a:p>
@@ -18849,19 +18755,27 @@
           <a:lstStyle/>
           <a:p>
             <a:r>
-              <a:rPr lang="en-US" dirty="0" err="1" smtClean="0"/>
-              <a:t>Git</a:t>
+              <a:rPr lang="en-US" dirty="0"/>
+              <a:t>M</a:t>
             </a:r>
             <a:r>
               <a:rPr lang="en-US" dirty="0" smtClean="0"/>
-              <a:t> repository</a:t>
+              <a:t>aterials</a:t>
+            </a:r>
+            <a:r>
+              <a:rPr lang="en-US" dirty="0" smtClean="0"/>
+              <a:t/>
             </a:r>
             <a:br>
               <a:rPr lang="en-US" dirty="0" smtClean="0"/>
             </a:br>
             <a:r>
               <a:rPr lang="en-US" sz="2400" dirty="0" smtClean="0"/>
-              <a:t>Cloning or pulling</a:t>
+              <a:t>Cloning or </a:t>
+            </a:r>
+            <a:r>
+              <a:rPr lang="en-US" sz="2400" dirty="0" smtClean="0"/>
+              <a:t>pulling the repository</a:t>
             </a:r>
             <a:endParaRPr lang="en-US" sz="2400" dirty="0"/>
           </a:p>
@@ -18880,12 +18794,12 @@
         <p:spPr>
           <a:xfrm>
             <a:off x="457199" y="2769432"/>
-            <a:ext cx="8191533" cy="1038069"/>
+            <a:ext cx="8191533" cy="1337874"/>
           </a:xfrm>
         </p:spPr>
         <p:txBody>
           <a:bodyPr>
-            <a:normAutofit fontScale="47500" lnSpcReduction="20000"/>
+            <a:normAutofit fontScale="55000" lnSpcReduction="20000"/>
           </a:bodyPr>
           <a:lstStyle/>
           <a:p>
@@ -19040,6 +18954,14 @@
               <a:t> $ cd </a:t>
             </a:r>
             <a:r>
+              <a:rPr lang="en-US" dirty="0" smtClean="0">
+                <a:latin typeface="Menlo" charset="0"/>
+                <a:ea typeface="Menlo" charset="0"/>
+                <a:cs typeface="Menlo" charset="0"/>
+              </a:rPr>
+              <a:t>2017_July/</a:t>
+            </a:r>
+            <a:r>
               <a:rPr lang="en-US" dirty="0" err="1" smtClean="0">
                 <a:latin typeface="Menlo" charset="0"/>
                 <a:ea typeface="Menlo" charset="0"/>
@@ -19048,12 +18970,20 @@
               <a:t>Day_Two</a:t>
             </a:r>
             <a:r>
-              <a:rPr lang="en-US" smtClean="0">
-                <a:latin typeface="Menlo" charset="0"/>
-                <a:ea typeface="Menlo" charset="0"/>
-                <a:cs typeface="Menlo" charset="0"/>
-              </a:rPr>
-              <a:t>/</a:t>
+              <a:rPr lang="en-US" dirty="0" smtClean="0">
+                <a:latin typeface="Menlo" charset="0"/>
+                <a:ea typeface="Menlo" charset="0"/>
+                <a:cs typeface="Menlo" charset="0"/>
+              </a:rPr>
+              <a:t>/[09]_</a:t>
+            </a:r>
+            <a:r>
+              <a:rPr lang="en-US" dirty="0" err="1" smtClean="0">
+                <a:latin typeface="Menlo" charset="0"/>
+                <a:ea typeface="Menlo" charset="0"/>
+                <a:cs typeface="Menlo" charset="0"/>
+              </a:rPr>
+              <a:t>htc</a:t>
             </a:r>
             <a:endParaRPr lang="en-US" dirty="0" smtClean="0">
               <a:latin typeface="Menlo" charset="0"/>
@@ -19110,15 +19040,7 @@
           <a:p>
             <a:r>
               <a:rPr lang="en-US" dirty="0" smtClean="0"/>
-              <a:t>Exercise </a:t>
-            </a:r>
-            <a:r>
-              <a:rPr lang="en-US" dirty="0" smtClean="0"/>
-              <a:t>2 </a:t>
-            </a:r>
-            <a:r>
-              <a:rPr lang="en-US" dirty="0" smtClean="0"/>
-              <a:t>(solution)</a:t>
+              <a:t>Exercise 2 (solution)</a:t>
             </a:r>
             <a:br>
               <a:rPr lang="en-US" dirty="0" smtClean="0"/>
@@ -19215,14 +19137,6 @@
               </a:rPr>
               <a:t>htc-exercise2-lb</a:t>
             </a:r>
-            <a:r>
-              <a:rPr lang="en-US" dirty="0" smtClean="0">
-                <a:latin typeface="Menlo" charset="0"/>
-                <a:ea typeface="Menlo" charset="0"/>
-                <a:cs typeface="Menlo" charset="0"/>
-              </a:rPr>
-              <a:t/>
-            </a:r>
             <a:br>
               <a:rPr lang="en-US" dirty="0" smtClean="0">
                 <a:latin typeface="Menlo" charset="0"/>
@@ -19741,15 +19655,7 @@
                 <a:ea typeface="Menlo" charset="0"/>
                 <a:cs typeface="Menlo" charset="0"/>
               </a:rPr>
-              <a:t>time </a:t>
-            </a:r>
-            <a:r>
-              <a:rPr lang="en-US" dirty="0" smtClean="0">
-                <a:latin typeface="Menlo" charset="0"/>
-                <a:ea typeface="Menlo" charset="0"/>
-                <a:cs typeface="Menlo" charset="0"/>
-              </a:rPr>
-              <a:t>(</a:t>
+              <a:t>time (</a:t>
             </a:r>
           </a:p>
           <a:p>
@@ -20023,15 +19929,7 @@
           <a:p>
             <a:r>
               <a:rPr lang="en-US" dirty="0" smtClean="0"/>
-              <a:t>Exercise </a:t>
-            </a:r>
-            <a:r>
-              <a:rPr lang="en-US" dirty="0" smtClean="0"/>
-              <a:t>2 </a:t>
-            </a:r>
-            <a:r>
-              <a:rPr lang="en-US" dirty="0" smtClean="0"/>
-              <a:t>(solution)</a:t>
+              <a:t>Exercise 2 (solution)</a:t>
             </a:r>
             <a:br>
               <a:rPr lang="en-US" dirty="0" smtClean="0"/>
@@ -20129,21 +20027,8 @@
                 <a:ea typeface="Menlo" charset="0"/>
                 <a:cs typeface="Menlo" charset="0"/>
               </a:rPr>
-              <a:t>&gt; </a:t>
-            </a:r>
-            <a:r>
-              <a:rPr lang="en-US" dirty="0" smtClean="0">
-                <a:latin typeface="Menlo" charset="0"/>
-                <a:ea typeface="Menlo" charset="0"/>
-                <a:cs typeface="Menlo" charset="0"/>
-              </a:rPr>
-              <a:t>solutions/exercise2.sh</a:t>
-            </a:r>
-            <a:endParaRPr lang="en-US" dirty="0" smtClean="0">
-              <a:latin typeface="Menlo" charset="0"/>
-              <a:ea typeface="Menlo" charset="0"/>
-              <a:cs typeface="Menlo" charset="0"/>
-            </a:endParaRPr>
+              <a:t>&gt; solutions/exercise2.sh</a:t>
+            </a:r>
           </a:p>
           <a:p>
             <a:pPr marL="114300" indent="0">
@@ -20236,15 +20121,7 @@
                 <a:ea typeface="Menlo" charset="0"/>
                 <a:cs typeface="Menlo" charset="0"/>
               </a:rPr>
-              <a:t>&gt; </a:t>
-            </a:r>
-            <a:r>
-              <a:rPr lang="en-US" dirty="0" smtClean="0">
-                <a:latin typeface="Menlo" charset="0"/>
-                <a:ea typeface="Menlo" charset="0"/>
-                <a:cs typeface="Menlo" charset="0"/>
-              </a:rPr>
-              <a:t>solutions/exercise2.sh</a:t>
+              <a:t>&gt; solutions/exercise2.sh</a:t>
             </a:r>
             <a:endParaRPr lang="en-US" dirty="0">
               <a:latin typeface="Menlo" charset="0"/>
@@ -20527,15 +20404,7 @@
                 <a:ea typeface="Helvetica Neue" charset="0"/>
                 <a:cs typeface="Helvetica Neue" charset="0"/>
               </a:rPr>
-              <a:t> </a:t>
-            </a:r>
-            <a:r>
-              <a:rPr lang="en-US" dirty="0" smtClean="0">
-                <a:latin typeface="Helvetica Neue" charset="0"/>
-                <a:ea typeface="Helvetica Neue" charset="0"/>
-                <a:cs typeface="Helvetica Neue" charset="0"/>
-              </a:rPr>
-              <a:t>arrays</a:t>
+              <a:t> arrays</a:t>
             </a:r>
           </a:p>
           <a:p>

</xml_diff>